<commit_message>
This is the revised paper
</commit_message>
<xml_diff>
--- a/Other Files/Diagram 0.pptx
+++ b/Other Files/Diagram 0.pptx
@@ -104,6 +104,11 @@
       </a:defRPr>
     </a:lvl9pPr>
   </p:defaultTextStyle>
+  <p:extLst>
+    <p:ext uri="{EFAFB233-063F-42B5-8137-9DF3F51BA10A}">
+      <p15:sldGuideLst xmlns:p15="http://schemas.microsoft.com/office/powerpoint/2012/main"/>
+    </p:ext>
+  </p:extLst>
 </p:presentation>
 </file>
 
@@ -254,7 +259,7 @@
           <a:p>
             <a:fld id="{52F3E631-6A50-4185-BDEE-0930A3F49231}" type="datetimeFigureOut">
               <a:rPr lang="en-US" smtClean="0"/>
-              <a:t>11/3/2024</a:t>
+              <a:t>11/6/2024</a:t>
             </a:fld>
             <a:endParaRPr lang="en-US"/>
           </a:p>
@@ -452,7 +457,7 @@
           <a:p>
             <a:fld id="{52F3E631-6A50-4185-BDEE-0930A3F49231}" type="datetimeFigureOut">
               <a:rPr lang="en-US" smtClean="0"/>
-              <a:t>11/3/2024</a:t>
+              <a:t>11/6/2024</a:t>
             </a:fld>
             <a:endParaRPr lang="en-US"/>
           </a:p>
@@ -660,7 +665,7 @@
           <a:p>
             <a:fld id="{52F3E631-6A50-4185-BDEE-0930A3F49231}" type="datetimeFigureOut">
               <a:rPr lang="en-US" smtClean="0"/>
-              <a:t>11/3/2024</a:t>
+              <a:t>11/6/2024</a:t>
             </a:fld>
             <a:endParaRPr lang="en-US"/>
           </a:p>
@@ -858,7 +863,7 @@
           <a:p>
             <a:fld id="{52F3E631-6A50-4185-BDEE-0930A3F49231}" type="datetimeFigureOut">
               <a:rPr lang="en-US" smtClean="0"/>
-              <a:t>11/3/2024</a:t>
+              <a:t>11/6/2024</a:t>
             </a:fld>
             <a:endParaRPr lang="en-US"/>
           </a:p>
@@ -1133,7 +1138,7 @@
           <a:p>
             <a:fld id="{52F3E631-6A50-4185-BDEE-0930A3F49231}" type="datetimeFigureOut">
               <a:rPr lang="en-US" smtClean="0"/>
-              <a:t>11/3/2024</a:t>
+              <a:t>11/6/2024</a:t>
             </a:fld>
             <a:endParaRPr lang="en-US"/>
           </a:p>
@@ -1398,7 +1403,7 @@
           <a:p>
             <a:fld id="{52F3E631-6A50-4185-BDEE-0930A3F49231}" type="datetimeFigureOut">
               <a:rPr lang="en-US" smtClean="0"/>
-              <a:t>11/3/2024</a:t>
+              <a:t>11/6/2024</a:t>
             </a:fld>
             <a:endParaRPr lang="en-US"/>
           </a:p>
@@ -1810,7 +1815,7 @@
           <a:p>
             <a:fld id="{52F3E631-6A50-4185-BDEE-0930A3F49231}" type="datetimeFigureOut">
               <a:rPr lang="en-US" smtClean="0"/>
-              <a:t>11/3/2024</a:t>
+              <a:t>11/6/2024</a:t>
             </a:fld>
             <a:endParaRPr lang="en-US"/>
           </a:p>
@@ -1951,7 +1956,7 @@
           <a:p>
             <a:fld id="{52F3E631-6A50-4185-BDEE-0930A3F49231}" type="datetimeFigureOut">
               <a:rPr lang="en-US" smtClean="0"/>
-              <a:t>11/3/2024</a:t>
+              <a:t>11/6/2024</a:t>
             </a:fld>
             <a:endParaRPr lang="en-US"/>
           </a:p>
@@ -2064,7 +2069,7 @@
           <a:p>
             <a:fld id="{52F3E631-6A50-4185-BDEE-0930A3F49231}" type="datetimeFigureOut">
               <a:rPr lang="en-US" smtClean="0"/>
-              <a:t>11/3/2024</a:t>
+              <a:t>11/6/2024</a:t>
             </a:fld>
             <a:endParaRPr lang="en-US"/>
           </a:p>
@@ -2375,7 +2380,7 @@
           <a:p>
             <a:fld id="{52F3E631-6A50-4185-BDEE-0930A3F49231}" type="datetimeFigureOut">
               <a:rPr lang="en-US" smtClean="0"/>
-              <a:t>11/3/2024</a:t>
+              <a:t>11/6/2024</a:t>
             </a:fld>
             <a:endParaRPr lang="en-US"/>
           </a:p>
@@ -2663,7 +2668,7 @@
           <a:p>
             <a:fld id="{52F3E631-6A50-4185-BDEE-0930A3F49231}" type="datetimeFigureOut">
               <a:rPr lang="en-US" smtClean="0"/>
-              <a:t>11/3/2024</a:t>
+              <a:t>11/6/2024</a:t>
             </a:fld>
             <a:endParaRPr lang="en-US"/>
           </a:p>
@@ -2904,7 +2909,7 @@
           <a:p>
             <a:fld id="{52F3E631-6A50-4185-BDEE-0930A3F49231}" type="datetimeFigureOut">
               <a:rPr lang="en-US" smtClean="0"/>
-              <a:t>11/3/2024</a:t>
+              <a:t>11/6/2024</a:t>
             </a:fld>
             <a:endParaRPr lang="en-US"/>
           </a:p>
@@ -5212,7 +5217,7 @@
                     <a:latin typeface="Times New Roman" panose="02020603050405020304" pitchFamily="18" charset="0"/>
                     <a:cs typeface="Times New Roman" panose="02020603050405020304" pitchFamily="18" charset="0"/>
                   </a:rPr>
-                  <a:t>Form Database</a:t>
+                  <a:t>Plan Database</a:t>
                 </a:r>
               </a:p>
             </p:txBody>
@@ -5527,7 +5532,7 @@
                     <a:latin typeface="Times New Roman" panose="02020603050405020304" pitchFamily="18" charset="0"/>
                     <a:cs typeface="Times New Roman" panose="02020603050405020304" pitchFamily="18" charset="0"/>
                   </a:rPr>
-                  <a:t>Form Database</a:t>
+                  <a:t>User Database</a:t>
                 </a:r>
               </a:p>
             </p:txBody>
@@ -5826,8 +5831,8 @@
         </p:nvGrpSpPr>
         <p:grpSpPr>
           <a:xfrm>
-            <a:off x="9754696" y="453030"/>
-            <a:ext cx="2195545" cy="315023"/>
+            <a:off x="9699994" y="421191"/>
+            <a:ext cx="2437304" cy="377855"/>
             <a:chOff x="6096000" y="3759773"/>
             <a:chExt cx="2195545" cy="315022"/>
           </a:xfrm>
@@ -5975,7 +5980,7 @@
                     <a:latin typeface="Times New Roman" panose="02020603050405020304" pitchFamily="18" charset="0"/>
                     <a:cs typeface="Times New Roman" panose="02020603050405020304" pitchFamily="18" charset="0"/>
                   </a:rPr>
-                  <a:t>Form Database</a:t>
+                  <a:t>Notification Database</a:t>
                 </a:r>
               </a:p>
             </p:txBody>
@@ -6053,13 +6058,13 @@
           <p:nvPr/>
         </p:nvCxnSpPr>
         <p:spPr>
-          <a:xfrm rot="16200000" flipH="1">
-            <a:off x="8332201" y="-2325818"/>
-            <a:ext cx="23189" cy="5542129"/>
+          <a:xfrm rot="5400000" flipH="1" flipV="1">
+            <a:off x="8387387" y="-2388893"/>
+            <a:ext cx="7894" cy="5637205"/>
           </a:xfrm>
           <a:prstGeom prst="bentConnector3">
             <a:avLst>
-              <a:gd name="adj1" fmla="val -806572"/>
+              <a:gd name="adj1" fmla="val 2995870"/>
             </a:avLst>
           </a:prstGeom>
           <a:ln w="19050">
@@ -6101,9 +6106,9 @@
           <p:nvPr/>
         </p:nvCxnSpPr>
         <p:spPr>
-          <a:xfrm>
-            <a:off x="11114866" y="750909"/>
-            <a:ext cx="31469" cy="4554012"/>
+          <a:xfrm flipH="1">
+            <a:off x="11146334" y="778481"/>
+            <a:ext cx="63603" cy="4526444"/>
           </a:xfrm>
           <a:prstGeom prst="straightConnector1">
             <a:avLst/>

</xml_diff>